<commit_message>
Actualizacion Semana 2 y calendarios
</commit_message>
<xml_diff>
--- a/Sesión_0/Introducción.pptx
+++ b/Sesión_0/Introducción.pptx
@@ -171,7 +171,7 @@
 <file path=ppt/revisionInfo.xml><?xml version="1.0" encoding="utf-8"?>
 <p1510:revInfo xmlns:a="http://schemas.openxmlformats.org/drawingml/2006/main" xmlns:r="http://schemas.openxmlformats.org/officeDocument/2006/relationships" xmlns:p1510="http://schemas.microsoft.com/office/powerpoint/2015/10/main">
   <p1510:revLst>
-    <p1510:client id="{29AE3C56-95F7-4B8B-A3E1-184D660B9D00}" v="47" dt="2025-02-04T14:46:36.705"/>
+    <p1510:client id="{29AE3C56-95F7-4B8B-A3E1-184D660B9D00}" v="48" dt="2025-02-05T17:54:16.019"/>
   </p1510:revLst>
 </p1510:revInfo>
 </file>
@@ -321,30 +321,6 @@
           <pc:docMk/>
           <pc:sldMk cId="2965408220" sldId="280"/>
         </pc:sldMkLst>
-        <pc:spChg chg="mod">
-          <ac:chgData name="JHEYSON FABIAN VILLAVISAN BUITRAGO" userId="e5ced5c2-d787-455d-b115-4f08a699b8c8" providerId="ADAL" clId="{F051727E-E815-4CBA-87EC-595602D579B3}" dt="2025-01-04T00:02:04.383" v="454" actId="1076"/>
-          <ac:spMkLst>
-            <pc:docMk/>
-            <pc:sldMk cId="2965408220" sldId="280"/>
-            <ac:spMk id="8" creationId="{5932E3F1-24A7-A01F-0773-6237BD556E80}"/>
-          </ac:spMkLst>
-        </pc:spChg>
-        <pc:graphicFrameChg chg="mod modGraphic">
-          <ac:chgData name="JHEYSON FABIAN VILLAVISAN BUITRAGO" userId="e5ced5c2-d787-455d-b115-4f08a699b8c8" providerId="ADAL" clId="{F051727E-E815-4CBA-87EC-595602D579B3}" dt="2025-01-14T00:20:48.181" v="475" actId="20577"/>
-          <ac:graphicFrameMkLst>
-            <pc:docMk/>
-            <pc:sldMk cId="2965408220" sldId="280"/>
-            <ac:graphicFrameMk id="6" creationId="{D45444DB-DE93-829B-F32A-C3FB962F868B}"/>
-          </ac:graphicFrameMkLst>
-        </pc:graphicFrameChg>
-        <pc:picChg chg="mod">
-          <ac:chgData name="JHEYSON FABIAN VILLAVISAN BUITRAGO" userId="e5ced5c2-d787-455d-b115-4f08a699b8c8" providerId="ADAL" clId="{F051727E-E815-4CBA-87EC-595602D579B3}" dt="2025-01-04T00:02:11.213" v="455" actId="14100"/>
-          <ac:picMkLst>
-            <pc:docMk/>
-            <pc:sldMk cId="2965408220" sldId="280"/>
-            <ac:picMk id="4" creationId="{F6C827CA-8E86-44AB-5043-B6D399FFB89D}"/>
-          </ac:picMkLst>
-        </pc:picChg>
       </pc:sldChg>
     </pc:docChg>
   </pc:docChgLst>
@@ -494,8 +470,8 @@
   </pc:docChgLst>
   <pc:docChgLst>
     <pc:chgData name="JHEYSON FABIAN VILLAVISAN BUITRAGO" userId="e5ced5c2-d787-455d-b115-4f08a699b8c8" providerId="ADAL" clId="{29AE3C56-95F7-4B8B-A3E1-184D660B9D00}"/>
-    <pc:docChg chg="undo redo custSel addSld modSld">
-      <pc:chgData name="JHEYSON FABIAN VILLAVISAN BUITRAGO" userId="e5ced5c2-d787-455d-b115-4f08a699b8c8" providerId="ADAL" clId="{29AE3C56-95F7-4B8B-A3E1-184D660B9D00}" dt="2025-02-05T14:07:08.820" v="1031" actId="313"/>
+    <pc:docChg chg="undo redo custSel addSld delSld modSld modSection">
+      <pc:chgData name="JHEYSON FABIAN VILLAVISAN BUITRAGO" userId="e5ced5c2-d787-455d-b115-4f08a699b8c8" providerId="ADAL" clId="{29AE3C56-95F7-4B8B-A3E1-184D660B9D00}" dt="2025-02-05T17:54:23.851" v="1038" actId="14734"/>
       <pc:docMkLst>
         <pc:docMk/>
       </pc:docMkLst>
@@ -660,8 +636,8 @@
           </ac:spMkLst>
         </pc:spChg>
       </pc:sldChg>
-      <pc:sldChg chg="modSp mod">
-        <pc:chgData name="JHEYSON FABIAN VILLAVISAN BUITRAGO" userId="e5ced5c2-d787-455d-b115-4f08a699b8c8" providerId="ADAL" clId="{29AE3C56-95F7-4B8B-A3E1-184D660B9D00}" dt="2025-02-04T13:40:01.726" v="20"/>
+      <pc:sldChg chg="addSp delSp modSp mod">
+        <pc:chgData name="JHEYSON FABIAN VILLAVISAN BUITRAGO" userId="e5ced5c2-d787-455d-b115-4f08a699b8c8" providerId="ADAL" clId="{29AE3C56-95F7-4B8B-A3E1-184D660B9D00}" dt="2025-02-05T17:54:09.141" v="1034" actId="22"/>
         <pc:sldMkLst>
           <pc:docMk/>
           <pc:sldMk cId="214171354" sldId="278"/>
@@ -674,9 +650,17 @@
             <ac:spMk id="5" creationId="{DA8BB1D7-DBA8-5CD6-CAAC-0581D75A6D40}"/>
           </ac:spMkLst>
         </pc:spChg>
+        <pc:spChg chg="add del">
+          <ac:chgData name="JHEYSON FABIAN VILLAVISAN BUITRAGO" userId="e5ced5c2-d787-455d-b115-4f08a699b8c8" providerId="ADAL" clId="{29AE3C56-95F7-4B8B-A3E1-184D660B9D00}" dt="2025-02-05T17:54:09.141" v="1034" actId="22"/>
+          <ac:spMkLst>
+            <pc:docMk/>
+            <pc:sldMk cId="214171354" sldId="278"/>
+            <ac:spMk id="6" creationId="{48360B4C-8C74-7353-FF15-E4175AF8440A}"/>
+          </ac:spMkLst>
+        </pc:spChg>
       </pc:sldChg>
-      <pc:sldChg chg="addSp modSp mod">
-        <pc:chgData name="JHEYSON FABIAN VILLAVISAN BUITRAGO" userId="e5ced5c2-d787-455d-b115-4f08a699b8c8" providerId="ADAL" clId="{29AE3C56-95F7-4B8B-A3E1-184D660B9D00}" dt="2025-02-05T14:07:08.820" v="1031" actId="313"/>
+      <pc:sldChg chg="addSp modSp add del mod">
+        <pc:chgData name="JHEYSON FABIAN VILLAVISAN BUITRAGO" userId="e5ced5c2-d787-455d-b115-4f08a699b8c8" providerId="ADAL" clId="{29AE3C56-95F7-4B8B-A3E1-184D660B9D00}" dt="2025-02-05T17:54:23.851" v="1038" actId="14734"/>
         <pc:sldMkLst>
           <pc:docMk/>
           <pc:sldMk cId="2965408220" sldId="280"/>
@@ -705,8 +689,16 @@
             <ac:spMk id="9" creationId="{79EF761A-FEAD-D9F3-BD56-49599C4CE1E2}"/>
           </ac:spMkLst>
         </pc:spChg>
+        <pc:spChg chg="mod">
+          <ac:chgData name="JHEYSON FABIAN VILLAVISAN BUITRAGO" userId="e5ced5c2-d787-455d-b115-4f08a699b8c8" providerId="ADAL" clId="{29AE3C56-95F7-4B8B-A3E1-184D660B9D00}" dt="2025-02-05T17:54:17.553" v="1036" actId="20577"/>
+          <ac:spMkLst>
+            <pc:docMk/>
+            <pc:sldMk cId="2965408220" sldId="280"/>
+            <ac:spMk id="11266" creationId="{74AD047A-E86C-4E92-874D-BAA043AB0B46}"/>
+          </ac:spMkLst>
+        </pc:spChg>
         <pc:graphicFrameChg chg="mod modGraphic">
-          <ac:chgData name="JHEYSON FABIAN VILLAVISAN BUITRAGO" userId="e5ced5c2-d787-455d-b115-4f08a699b8c8" providerId="ADAL" clId="{29AE3C56-95F7-4B8B-A3E1-184D660B9D00}" dt="2025-02-05T14:07:08.820" v="1031" actId="313"/>
+          <ac:chgData name="JHEYSON FABIAN VILLAVISAN BUITRAGO" userId="e5ced5c2-d787-455d-b115-4f08a699b8c8" providerId="ADAL" clId="{29AE3C56-95F7-4B8B-A3E1-184D660B9D00}" dt="2025-02-05T17:54:23.851" v="1038" actId="14734"/>
           <ac:graphicFrameMkLst>
             <pc:docMk/>
             <pc:sldMk cId="2965408220" sldId="280"/>
@@ -14152,14 +14144,14 @@
           <p:nvPr>
             <p:extLst>
               <p:ext uri="{D42A27DB-BD31-4B8C-83A1-F6EECF244321}">
-                <p14:modId xmlns:p14="http://schemas.microsoft.com/office/powerpoint/2010/main" val="2826288816"/>
+                <p14:modId xmlns:p14="http://schemas.microsoft.com/office/powerpoint/2010/main" val="2028071119"/>
               </p:ext>
             </p:extLst>
           </p:nvPr>
         </p:nvGraphicFramePr>
         <p:xfrm>
           <a:off x="863588" y="620688"/>
-          <a:ext cx="7416824" cy="5356828"/>
+          <a:ext cx="7416824" cy="5483937"/>
         </p:xfrm>
         <a:graphic>
           <a:graphicData uri="http://schemas.openxmlformats.org/drawingml/2006/table">
@@ -14599,13 +14591,16 @@
                       </a:pPr>
                       <a:r>
                         <a:rPr lang="es-CO" sz="1000" dirty="0"/>
-                        <a:t>Introducción a C (Sentencias, Ciclos, Funciones</a:t>
+                        <a:t>Introducción a C (Sentencias, Ciclos, Funciones, </a:t>
                       </a:r>
                       <a:r>
-                        <a:rPr lang="es-CO" sz="1000"/>
-                        <a:t>, Librería)</a:t>
+                        <a:rPr lang="es-CO" sz="1000" dirty="0" err="1"/>
+                        <a:t>Libreria</a:t>
                       </a:r>
-                      <a:endParaRPr lang="es-CO" sz="1000" dirty="0"/>
+                      <a:r>
+                        <a:rPr lang="es-CO" sz="1000" dirty="0"/>
+                        <a:t>)</a:t>
+                      </a:r>
                     </a:p>
                   </a:txBody>
                   <a:tcPr>
@@ -14765,20 +14760,27 @@
                     <a:bodyPr/>
                     <a:lstStyle/>
                     <a:p>
-                      <a:pPr algn="ctr"/>
-                      <a:r>
-                        <a:rPr lang="es-CO" sz="1000" dirty="0" err="1"/>
-                        <a:t>PSoC</a:t>
-                      </a:r>
+                      <a:pPr marL="0" marR="0" lvl="0" indent="0" algn="ctr" defTabSz="685800" rtl="0" eaLnBrk="1" fontAlgn="auto" latinLnBrk="0" hangingPunct="1">
+                        <a:lnSpc>
+                          <a:spcPct val="100000"/>
+                        </a:lnSpc>
+                        <a:spcBef>
+                          <a:spcPts val="0"/>
+                        </a:spcBef>
+                        <a:spcAft>
+                          <a:spcPts val="0"/>
+                        </a:spcAft>
+                        <a:buClrTx/>
+                        <a:buSzTx/>
+                        <a:buFontTx/>
+                        <a:buNone/>
+                        <a:tabLst/>
+                        <a:defRPr/>
+                      </a:pPr>
                       <a:r>
                         <a:rPr lang="es-CO" sz="1000" dirty="0"/>
-                        <a:t> </a:t>
+                        <a:t>Laboratorio</a:t>
                       </a:r>
-                      <a:r>
-                        <a:rPr lang="es-CO" sz="1000"/>
-                        <a:t>Creator</a:t>
-                      </a:r>
-                      <a:endParaRPr lang="es-CO" sz="1000" dirty="0"/>
                     </a:p>
                   </a:txBody>
                   <a:tcPr>
@@ -14940,6 +14942,54 @@
                   <a:txBody>
                     <a:bodyPr/>
                     <a:lstStyle/>
+                    <a:p>
+                      <a:pPr marL="0" marR="0" lvl="0" indent="0" algn="ctr" defTabSz="685800" rtl="0" eaLnBrk="1" fontAlgn="auto" latinLnBrk="0" hangingPunct="1">
+                        <a:lnSpc>
+                          <a:spcPct val="100000"/>
+                        </a:lnSpc>
+                        <a:spcBef>
+                          <a:spcPts val="0"/>
+                        </a:spcBef>
+                        <a:spcAft>
+                          <a:spcPts val="0"/>
+                        </a:spcAft>
+                        <a:buClrTx/>
+                        <a:buSzTx/>
+                        <a:buFontTx/>
+                        <a:buNone/>
+                        <a:tabLst/>
+                        <a:defRPr/>
+                      </a:pPr>
+                      <a:r>
+                        <a:rPr lang="es-CO" sz="1000" dirty="0" err="1">
+                          <a:highlight>
+                            <a:srgbClr val="00FFFF"/>
+                          </a:highlight>
+                        </a:rPr>
+                        <a:t>PSoC</a:t>
+                      </a:r>
+                      <a:r>
+                        <a:rPr lang="es-CO" sz="1000" dirty="0">
+                          <a:highlight>
+                            <a:srgbClr val="00FFFF"/>
+                          </a:highlight>
+                        </a:rPr>
+                        <a:t> </a:t>
+                      </a:r>
+                      <a:r>
+                        <a:rPr lang="es-CO" sz="1000" dirty="0" err="1">
+                          <a:highlight>
+                            <a:srgbClr val="00FFFF"/>
+                          </a:highlight>
+                        </a:rPr>
+                        <a:t>Creator</a:t>
+                      </a:r>
+                      <a:endParaRPr lang="es-CO" sz="1000" dirty="0">
+                        <a:highlight>
+                          <a:srgbClr val="00FFFF"/>
+                        </a:highlight>
+                      </a:endParaRPr>
+                    </a:p>
                     <a:p>
                       <a:pPr algn="ctr"/>
                       <a:r>
@@ -22514,23 +22564,6 @@
 </file>
 
 <file path=customXml/item1.xml><?xml version="1.0" encoding="utf-8"?>
-<?mso-contentType ?>
-<FormTemplates xmlns="http://schemas.microsoft.com/sharepoint/v3/contenttype/forms">
-  <Display>DocumentLibraryForm</Display>
-  <Edit>DocumentLibraryForm</Edit>
-  <New>DocumentLibraryForm</New>
-</FormTemplates>
-</file>
-
-<file path=customXml/item2.xml><?xml version="1.0" encoding="utf-8"?>
-<p:properties xmlns:p="http://schemas.microsoft.com/office/2006/metadata/properties" xmlns:xsi="http://www.w3.org/2001/XMLSchema-instance" xmlns:pc="http://schemas.microsoft.com/office/infopath/2007/PartnerControls">
-  <documentManagement>
-    <_activity xmlns="bdc56f61-abc0-4f7e-bfec-a93ccd1ae886" xsi:nil="true"/>
-  </documentManagement>
-</p:properties>
-</file>
-
-<file path=customXml/item3.xml><?xml version="1.0" encoding="utf-8"?>
 <ct:contentTypeSchema xmlns:ct="http://schemas.microsoft.com/office/2006/metadata/contentType" xmlns:ma="http://schemas.microsoft.com/office/2006/metadata/properties/metaAttributes" ct:_="" ma:_="" ma:contentTypeName="Documento" ma:contentTypeID="0x0101007A62137D465CE64A8C883A4664514BF8" ma:contentTypeVersion="15" ma:contentTypeDescription="Crear nuevo documento." ma:contentTypeScope="" ma:versionID="a1bd1d59f691eb9bca6952b111268275">
   <xsd:schema xmlns:xsd="http://www.w3.org/2001/XMLSchema" xmlns:xs="http://www.w3.org/2001/XMLSchema" xmlns:p="http://schemas.microsoft.com/office/2006/metadata/properties" xmlns:ns3="669280c1-d17e-4d1d-bd7f-b4f14cc6bf1d" xmlns:ns4="bdc56f61-abc0-4f7e-bfec-a93ccd1ae886" targetNamespace="http://schemas.microsoft.com/office/2006/metadata/properties" ma:root="true" ma:fieldsID="d02990a02f19f0f9fc7b999b1809cae4" ns3:_="" ns4:_="">
     <xsd:import namespace="669280c1-d17e-4d1d-bd7f-b4f14cc6bf1d"/>
@@ -22765,10 +22798,38 @@
 </ct:contentTypeSchema>
 </file>
 
+<file path=customXml/item2.xml><?xml version="1.0" encoding="utf-8"?>
+<p:properties xmlns:p="http://schemas.microsoft.com/office/2006/metadata/properties" xmlns:xsi="http://www.w3.org/2001/XMLSchema-instance" xmlns:pc="http://schemas.microsoft.com/office/infopath/2007/PartnerControls">
+  <documentManagement>
+    <_activity xmlns="bdc56f61-abc0-4f7e-bfec-a93ccd1ae886" xsi:nil="true"/>
+  </documentManagement>
+</p:properties>
+</file>
+
+<file path=customXml/item3.xml><?xml version="1.0" encoding="utf-8"?>
+<?mso-contentType ?>
+<FormTemplates xmlns="http://schemas.microsoft.com/sharepoint/v3/contenttype/forms">
+  <Display>DocumentLibraryForm</Display>
+  <Edit>DocumentLibraryForm</Edit>
+  <New>DocumentLibraryForm</New>
+</FormTemplates>
+</file>
+
 <file path=customXml/itemProps1.xml><?xml version="1.0" encoding="utf-8"?>
-<ds:datastoreItem xmlns:ds="http://schemas.openxmlformats.org/officeDocument/2006/customXml" ds:itemID="{4E8623C8-32E1-48B0-9F0A-13F2E9582B7E}">
+<ds:datastoreItem xmlns:ds="http://schemas.openxmlformats.org/officeDocument/2006/customXml" ds:itemID="{025820C3-FD82-4EFC-BF14-EAF1F9613F52}">
   <ds:schemaRefs>
-    <ds:schemaRef ds:uri="http://schemas.microsoft.com/sharepoint/v3/contenttype/forms"/>
+    <ds:schemaRef ds:uri="http://schemas.microsoft.com/office/2006/metadata/contentType"/>
+    <ds:schemaRef ds:uri="http://schemas.microsoft.com/office/2006/metadata/properties/metaAttributes"/>
+    <ds:schemaRef ds:uri="http://www.w3.org/2001/XMLSchema"/>
+    <ds:schemaRef ds:uri="http://schemas.microsoft.com/office/2006/metadata/properties"/>
+    <ds:schemaRef ds:uri="669280c1-d17e-4d1d-bd7f-b4f14cc6bf1d"/>
+    <ds:schemaRef ds:uri="bdc56f61-abc0-4f7e-bfec-a93ccd1ae886"/>
+    <ds:schemaRef ds:uri="http://schemas.microsoft.com/office/2006/documentManagement/types"/>
+    <ds:schemaRef ds:uri="http://schemas.microsoft.com/office/infopath/2007/PartnerControls"/>
+    <ds:schemaRef ds:uri="http://schemas.openxmlformats.org/package/2006/metadata/core-properties"/>
+    <ds:schemaRef ds:uri="http://purl.org/dc/elements/1.1/"/>
+    <ds:schemaRef ds:uri="http://purl.org/dc/terms/"/>
+    <ds:schemaRef ds:uri="http://schemas.microsoft.com/internal/obd"/>
   </ds:schemaRefs>
 </ds:datastoreItem>
 </file>
@@ -22791,20 +22852,9 @@
 </file>
 
 <file path=customXml/itemProps3.xml><?xml version="1.0" encoding="utf-8"?>
-<ds:datastoreItem xmlns:ds="http://schemas.openxmlformats.org/officeDocument/2006/customXml" ds:itemID="{025820C3-FD82-4EFC-BF14-EAF1F9613F52}">
+<ds:datastoreItem xmlns:ds="http://schemas.openxmlformats.org/officeDocument/2006/customXml" ds:itemID="{4E8623C8-32E1-48B0-9F0A-13F2E9582B7E}">
   <ds:schemaRefs>
-    <ds:schemaRef ds:uri="http://schemas.microsoft.com/office/2006/metadata/contentType"/>
-    <ds:schemaRef ds:uri="http://schemas.microsoft.com/office/2006/metadata/properties/metaAttributes"/>
-    <ds:schemaRef ds:uri="http://www.w3.org/2001/XMLSchema"/>
-    <ds:schemaRef ds:uri="http://schemas.microsoft.com/office/2006/metadata/properties"/>
-    <ds:schemaRef ds:uri="669280c1-d17e-4d1d-bd7f-b4f14cc6bf1d"/>
-    <ds:schemaRef ds:uri="bdc56f61-abc0-4f7e-bfec-a93ccd1ae886"/>
-    <ds:schemaRef ds:uri="http://schemas.microsoft.com/office/2006/documentManagement/types"/>
-    <ds:schemaRef ds:uri="http://schemas.microsoft.com/office/infopath/2007/PartnerControls"/>
-    <ds:schemaRef ds:uri="http://schemas.openxmlformats.org/package/2006/metadata/core-properties"/>
-    <ds:schemaRef ds:uri="http://purl.org/dc/elements/1.1/"/>
-    <ds:schemaRef ds:uri="http://purl.org/dc/terms/"/>
-    <ds:schemaRef ds:uri="http://schemas.microsoft.com/internal/obd"/>
+    <ds:schemaRef ds:uri="http://schemas.microsoft.com/sharepoint/v3/contenttype/forms"/>
   </ds:schemaRefs>
 </ds:datastoreItem>
 </file>
</xml_diff>

<commit_message>
Actualización Sesión 2 V4
</commit_message>
<xml_diff>
--- a/Sesión_0/Introducción.pptx
+++ b/Sesión_0/Introducción.pptx
@@ -471,7 +471,7 @@
   <pc:docChgLst>
     <pc:chgData name="JHEYSON FABIAN VILLAVISAN BUITRAGO" userId="e5ced5c2-d787-455d-b115-4f08a699b8c8" providerId="ADAL" clId="{29AE3C56-95F7-4B8B-A3E1-184D660B9D00}"/>
     <pc:docChg chg="undo redo custSel addSld delSld modSld modSection">
-      <pc:chgData name="JHEYSON FABIAN VILLAVISAN BUITRAGO" userId="e5ced5c2-d787-455d-b115-4f08a699b8c8" providerId="ADAL" clId="{29AE3C56-95F7-4B8B-A3E1-184D660B9D00}" dt="2025-02-05T17:54:23.851" v="1038" actId="14734"/>
+      <pc:chgData name="JHEYSON FABIAN VILLAVISAN BUITRAGO" userId="e5ced5c2-d787-455d-b115-4f08a699b8c8" providerId="ADAL" clId="{29AE3C56-95F7-4B8B-A3E1-184D660B9D00}" dt="2025-02-05T18:09:28.107" v="1130" actId="1076"/>
       <pc:docMkLst>
         <pc:docMk/>
       </pc:docMkLst>
@@ -660,13 +660,13 @@
         </pc:spChg>
       </pc:sldChg>
       <pc:sldChg chg="addSp modSp add del mod">
-        <pc:chgData name="JHEYSON FABIAN VILLAVISAN BUITRAGO" userId="e5ced5c2-d787-455d-b115-4f08a699b8c8" providerId="ADAL" clId="{29AE3C56-95F7-4B8B-A3E1-184D660B9D00}" dt="2025-02-05T17:54:23.851" v="1038" actId="14734"/>
+        <pc:chgData name="JHEYSON FABIAN VILLAVISAN BUITRAGO" userId="e5ced5c2-d787-455d-b115-4f08a699b8c8" providerId="ADAL" clId="{29AE3C56-95F7-4B8B-A3E1-184D660B9D00}" dt="2025-02-05T18:09:28.107" v="1130" actId="1076"/>
         <pc:sldMkLst>
           <pc:docMk/>
           <pc:sldMk cId="2965408220" sldId="280"/>
         </pc:sldMkLst>
         <pc:spChg chg="add mod">
-          <ac:chgData name="JHEYSON FABIAN VILLAVISAN BUITRAGO" userId="e5ced5c2-d787-455d-b115-4f08a699b8c8" providerId="ADAL" clId="{29AE3C56-95F7-4B8B-A3E1-184D660B9D00}" dt="2025-02-04T14:26:43.825" v="991" actId="13926"/>
+          <ac:chgData name="JHEYSON FABIAN VILLAVISAN BUITRAGO" userId="e5ced5c2-d787-455d-b115-4f08a699b8c8" providerId="ADAL" clId="{29AE3C56-95F7-4B8B-A3E1-184D660B9D00}" dt="2025-02-05T18:09:28.107" v="1130" actId="1076"/>
           <ac:spMkLst>
             <pc:docMk/>
             <pc:sldMk cId="2965408220" sldId="280"/>
@@ -17576,8 +17576,8 @@
         </p:nvSpPr>
         <p:spPr>
           <a:xfrm>
-            <a:off x="611560" y="5926708"/>
-            <a:ext cx="8064896" cy="523220"/>
+            <a:off x="422378" y="6096157"/>
+            <a:ext cx="8064896" cy="738664"/>
           </a:xfrm>
           <a:prstGeom prst="rect">
             <a:avLst/>
@@ -17706,7 +17706,23 @@
                   <a:srgbClr val="00FFFF"/>
                 </a:highlight>
               </a:rPr>
-              <a:t> 5LP</a:t>
+              <a:t> 5LP (Se requieren materiales como leds </a:t>
+            </a:r>
+            <a:r>
+              <a:rPr lang="es-CO" sz="1400" dirty="0" err="1">
+                <a:highlight>
+                  <a:srgbClr val="00FFFF"/>
+                </a:highlight>
+              </a:rPr>
+              <a:t>etc</a:t>
+            </a:r>
+            <a:r>
+              <a:rPr lang="es-CO" sz="1400" dirty="0">
+                <a:highlight>
+                  <a:srgbClr val="00FFFF"/>
+                </a:highlight>
+              </a:rPr>
+              <a:t>)</a:t>
             </a:r>
           </a:p>
           <a:p>
@@ -17750,6 +17766,13 @@
               </a:rPr>
               <a:t> 2</a:t>
             </a:r>
+          </a:p>
+          <a:p>
+            <a:endParaRPr lang="es-CO" sz="1400" dirty="0">
+              <a:highlight>
+                <a:srgbClr val="FF00FF"/>
+              </a:highlight>
+            </a:endParaRPr>
           </a:p>
         </p:txBody>
       </p:sp>
@@ -22564,6 +22587,14 @@
 </file>
 
 <file path=customXml/item1.xml><?xml version="1.0" encoding="utf-8"?>
+<p:properties xmlns:p="http://schemas.microsoft.com/office/2006/metadata/properties" xmlns:xsi="http://www.w3.org/2001/XMLSchema-instance" xmlns:pc="http://schemas.microsoft.com/office/infopath/2007/PartnerControls">
+  <documentManagement>
+    <_activity xmlns="bdc56f61-abc0-4f7e-bfec-a93ccd1ae886" xsi:nil="true"/>
+  </documentManagement>
+</p:properties>
+</file>
+
+<file path=customXml/item2.xml><?xml version="1.0" encoding="utf-8"?>
 <ct:contentTypeSchema xmlns:ct="http://schemas.microsoft.com/office/2006/metadata/contentType" xmlns:ma="http://schemas.microsoft.com/office/2006/metadata/properties/metaAttributes" ct:_="" ma:_="" ma:contentTypeName="Documento" ma:contentTypeID="0x0101007A62137D465CE64A8C883A4664514BF8" ma:contentTypeVersion="15" ma:contentTypeDescription="Crear nuevo documento." ma:contentTypeScope="" ma:versionID="a1bd1d59f691eb9bca6952b111268275">
   <xsd:schema xmlns:xsd="http://www.w3.org/2001/XMLSchema" xmlns:xs="http://www.w3.org/2001/XMLSchema" xmlns:p="http://schemas.microsoft.com/office/2006/metadata/properties" xmlns:ns3="669280c1-d17e-4d1d-bd7f-b4f14cc6bf1d" xmlns:ns4="bdc56f61-abc0-4f7e-bfec-a93ccd1ae886" targetNamespace="http://schemas.microsoft.com/office/2006/metadata/properties" ma:root="true" ma:fieldsID="d02990a02f19f0f9fc7b999b1809cae4" ns3:_="" ns4:_="">
     <xsd:import namespace="669280c1-d17e-4d1d-bd7f-b4f14cc6bf1d"/>
@@ -22798,14 +22829,6 @@
 </ct:contentTypeSchema>
 </file>
 
-<file path=customXml/item2.xml><?xml version="1.0" encoding="utf-8"?>
-<p:properties xmlns:p="http://schemas.microsoft.com/office/2006/metadata/properties" xmlns:xsi="http://www.w3.org/2001/XMLSchema-instance" xmlns:pc="http://schemas.microsoft.com/office/infopath/2007/PartnerControls">
-  <documentManagement>
-    <_activity xmlns="bdc56f61-abc0-4f7e-bfec-a93ccd1ae886" xsi:nil="true"/>
-  </documentManagement>
-</p:properties>
-</file>
-
 <file path=customXml/item3.xml><?xml version="1.0" encoding="utf-8"?>
 <?mso-contentType ?>
 <FormTemplates xmlns="http://schemas.microsoft.com/sharepoint/v3/contenttype/forms">
@@ -22816,6 +22839,23 @@
 </file>
 
 <file path=customXml/itemProps1.xml><?xml version="1.0" encoding="utf-8"?>
+<ds:datastoreItem xmlns:ds="http://schemas.openxmlformats.org/officeDocument/2006/customXml" ds:itemID="{0825853C-1B27-4995-A583-4D39F900BB7F}">
+  <ds:schemaRefs>
+    <ds:schemaRef ds:uri="http://schemas.microsoft.com/office/2006/documentManagement/types"/>
+    <ds:schemaRef ds:uri="http://purl.org/dc/dcmitype/"/>
+    <ds:schemaRef ds:uri="http://schemas.openxmlformats.org/package/2006/metadata/core-properties"/>
+    <ds:schemaRef ds:uri="669280c1-d17e-4d1d-bd7f-b4f14cc6bf1d"/>
+    <ds:schemaRef ds:uri="http://purl.org/dc/elements/1.1/"/>
+    <ds:schemaRef ds:uri="http://purl.org/dc/terms/"/>
+    <ds:schemaRef ds:uri="http://schemas.microsoft.com/office/infopath/2007/PartnerControls"/>
+    <ds:schemaRef ds:uri="bdc56f61-abc0-4f7e-bfec-a93ccd1ae886"/>
+    <ds:schemaRef ds:uri="http://schemas.microsoft.com/office/2006/metadata/properties"/>
+    <ds:schemaRef ds:uri="http://www.w3.org/XML/1998/namespace"/>
+  </ds:schemaRefs>
+</ds:datastoreItem>
+</file>
+
+<file path=customXml/itemProps2.xml><?xml version="1.0" encoding="utf-8"?>
 <ds:datastoreItem xmlns:ds="http://schemas.openxmlformats.org/officeDocument/2006/customXml" ds:itemID="{025820C3-FD82-4EFC-BF14-EAF1F9613F52}">
   <ds:schemaRefs>
     <ds:schemaRef ds:uri="http://schemas.microsoft.com/office/2006/metadata/contentType"/>
@@ -22834,23 +22874,6 @@
 </ds:datastoreItem>
 </file>
 
-<file path=customXml/itemProps2.xml><?xml version="1.0" encoding="utf-8"?>
-<ds:datastoreItem xmlns:ds="http://schemas.openxmlformats.org/officeDocument/2006/customXml" ds:itemID="{0825853C-1B27-4995-A583-4D39F900BB7F}">
-  <ds:schemaRefs>
-    <ds:schemaRef ds:uri="http://schemas.microsoft.com/office/2006/documentManagement/types"/>
-    <ds:schemaRef ds:uri="http://purl.org/dc/dcmitype/"/>
-    <ds:schemaRef ds:uri="http://schemas.openxmlformats.org/package/2006/metadata/core-properties"/>
-    <ds:schemaRef ds:uri="669280c1-d17e-4d1d-bd7f-b4f14cc6bf1d"/>
-    <ds:schemaRef ds:uri="http://purl.org/dc/elements/1.1/"/>
-    <ds:schemaRef ds:uri="http://purl.org/dc/terms/"/>
-    <ds:schemaRef ds:uri="http://schemas.microsoft.com/office/infopath/2007/PartnerControls"/>
-    <ds:schemaRef ds:uri="bdc56f61-abc0-4f7e-bfec-a93ccd1ae886"/>
-    <ds:schemaRef ds:uri="http://schemas.microsoft.com/office/2006/metadata/properties"/>
-    <ds:schemaRef ds:uri="http://www.w3.org/XML/1998/namespace"/>
-  </ds:schemaRefs>
-</ds:datastoreItem>
-</file>
-
 <file path=customXml/itemProps3.xml><?xml version="1.0" encoding="utf-8"?>
 <ds:datastoreItem xmlns:ds="http://schemas.openxmlformats.org/officeDocument/2006/customXml" ds:itemID="{4E8623C8-32E1-48B0-9F0A-13F2E9582B7E}">
   <ds:schemaRefs>

</xml_diff>